<commit_message>
Few changes to PP.
</commit_message>
<xml_diff>
--- a/documentation/Phase1.pptx
+++ b/documentation/Phase1.pptx
@@ -111,7 +111,7 @@
   </p:defaultTextStyle>
   <p:extLst>
     <p:ext uri="{EFAFB233-063F-42B5-8137-9DF3F51BA10A}">
-      <p15:sldGuideLst xmlns:p15="http://schemas.microsoft.com/office/powerpoint/2012/main">
+      <p15:sldGuideLst xmlns:p15="http://schemas.microsoft.com/office/powerpoint/2012/main" xmlns="">
         <p15:guide id="1" orient="horz" pos="2160">
           <p15:clr>
             <a:srgbClr val="A4A3A4"/>
@@ -134,26 +134,8 @@
 </p:cmAuthorLst>
 </file>
 
-<file path=ppt/comments/comment1.xml><?xml version="1.0" encoding="utf-8"?>
-<p:cmLst xmlns:a="http://schemas.openxmlformats.org/drawingml/2006/main" xmlns:r="http://schemas.openxmlformats.org/officeDocument/2006/relationships" xmlns:p="http://schemas.openxmlformats.org/presentationml/2006/main">
-  <p:cm authorId="0" dt="2018-04-19T14:24:18.697" idx="2">
-    <p:pos x="4728" y="173"/>
-    <p:text>Need a fancy title for this one as well</p:text>
-  </p:cm>
-</p:cmLst>
-</file>
-
-<file path=ppt/comments/comment2.xml><?xml version="1.0" encoding="utf-8"?>
-<p:cmLst xmlns:a="http://schemas.openxmlformats.org/drawingml/2006/main" xmlns:r="http://schemas.openxmlformats.org/officeDocument/2006/relationships" xmlns:p="http://schemas.openxmlformats.org/presentationml/2006/main">
-  <p:cm authorId="0" dt="2018-04-19T14:23:38.268" idx="1">
-    <p:pos x="5503" y="335"/>
-    <p:text>Maybe not the best slide title.</p:text>
-  </p:cm>
-  <p:cm authorId="0" dt="2018-04-19T14:25:59.128" idx="3">
-    <p:pos x="3167" y="2513"/>
-    <p:text>Any other diagrams needed? Such as control unit diagrams? Not sure therefore putting a note for it.</p:text>
-  </p:cm>
-</p:cmLst>
+<file path=ppt/revisionInfo.xml><?xml version="1.0" encoding="utf-8"?>
+<p1510:revInfo xmlns:a="http://schemas.openxmlformats.org/drawingml/2006/main" xmlns:r="http://schemas.openxmlformats.org/officeDocument/2006/relationships" xmlns:p1510="http://schemas.microsoft.com/office/powerpoint/2015/10/main"/>
 </file>
 
 <file path=ppt/slideLayouts/slideLayout1.xml><?xml version="1.0" encoding="utf-8"?>
@@ -236,9 +218,7 @@
         </p:style>
         <p:txBody>
           <a:bodyPr anchor="ctr"/>
-          <a:lstStyle>
-            <a:extLst/>
-          </a:lstStyle>
+          <a:lstStyle/>
           <a:p>
             <a:pPr algn="ctr" eaLnBrk="1" latinLnBrk="0" hangingPunct="1"/>
             <a:endParaRPr kumimoji="0" lang="en-US"/>
@@ -291,10 +271,9 @@
           </a:lstStyle>
           <a:p>
             <a:r>
-              <a:rPr kumimoji="0" lang="en-US" smtClean="0"/>
+              <a:rPr kumimoji="0" lang="en-US"/>
               <a:t>Click to edit Master title style</a:t>
             </a:r>
-            <a:endParaRPr kumimoji="0" lang="en-US"/>
           </a:p>
         </p:txBody>
       </p:sp>
@@ -353,10 +332,9 @@
           </a:lstStyle>
           <a:p>
             <a:r>
-              <a:rPr kumimoji="0" lang="en-US" smtClean="0"/>
+              <a:rPr kumimoji="0" lang="en-US"/>
               <a:t>Click to edit Master subtitle style</a:t>
             </a:r>
-            <a:endParaRPr kumimoji="0" lang="en-US"/>
           </a:p>
         </p:txBody>
       </p:sp>
@@ -451,9 +429,7 @@
           </p:spPr>
           <p:txBody>
             <a:bodyPr vert="horz" wrap="square" lIns="91440" tIns="45720" rIns="91440" bIns="45720" anchor="t" compatLnSpc="1"/>
-            <a:lstStyle>
-              <a:extLst/>
-            </a:lstStyle>
+            <a:lstStyle/>
             <a:p>
               <a:endParaRPr kumimoji="0" lang="en-US"/>
             </a:p>
@@ -533,9 +509,7 @@
           </p:spPr>
           <p:txBody>
             <a:bodyPr vert="horz" wrap="square" lIns="91440" tIns="45720" rIns="91440" bIns="45720" anchor="t" compatLnSpc="1"/>
-            <a:lstStyle>
-              <a:extLst/>
-            </a:lstStyle>
+            <a:lstStyle/>
             <a:p>
               <a:endParaRPr kumimoji="0" lang="en-US"/>
             </a:p>
@@ -692,9 +666,7 @@
           </p:style>
           <p:txBody>
             <a:bodyPr vert="horz" wrap="square" lIns="91440" tIns="45720" rIns="91440" bIns="45720" anchor="ctr" compatLnSpc="1"/>
-            <a:lstStyle>
-              <a:extLst/>
-            </a:lstStyle>
+            <a:lstStyle/>
             <a:p>
               <a:pPr algn="ctr" eaLnBrk="1" latinLnBrk="0" hangingPunct="1"/>
               <a:endParaRPr kumimoji="0" lang="en-US"/>
@@ -782,7 +754,7 @@
             <a:fld id="{1371BCB6-6998-44A0-A399-0C960E52A424}" type="datetimeFigureOut">
               <a:rPr lang="en-NZ" smtClean="0"/>
               <a:pPr/>
-              <a:t>19/04/2018</a:t>
+              <a:t>20/04/2018</a:t>
             </a:fld>
             <a:endParaRPr lang="en-NZ"/>
           </a:p>
@@ -889,15 +861,12 @@
         <p:spPr/>
         <p:txBody>
           <a:bodyPr/>
-          <a:lstStyle>
-            <a:extLst/>
-          </a:lstStyle>
-          <a:p>
-            <a:r>
-              <a:rPr kumimoji="0" lang="en-US" smtClean="0"/>
+          <a:lstStyle/>
+          <a:p>
+            <a:r>
+              <a:rPr kumimoji="0" lang="en-US"/>
               <a:t>Click to edit Master title style</a:t>
             </a:r>
-            <a:endParaRPr kumimoji="0" lang="en-US"/>
           </a:p>
         </p:txBody>
       </p:sp>
@@ -919,41 +888,39 @@
         </p:spPr>
         <p:txBody>
           <a:bodyPr vert="eaVert"/>
-          <a:lstStyle>
-            <a:extLst/>
-          </a:lstStyle>
+          <a:lstStyle/>
           <a:p>
             <a:pPr lvl="0" eaLnBrk="1" latinLnBrk="0" hangingPunct="1"/>
             <a:r>
-              <a:rPr lang="en-US" smtClean="0"/>
+              <a:rPr lang="en-US"/>
               <a:t>Click to edit Master text styles</a:t>
             </a:r>
           </a:p>
           <a:p>
             <a:pPr lvl="1" eaLnBrk="1" latinLnBrk="0" hangingPunct="1"/>
             <a:r>
-              <a:rPr lang="en-US" smtClean="0"/>
+              <a:rPr lang="en-US"/>
               <a:t>Second level</a:t>
             </a:r>
           </a:p>
           <a:p>
             <a:pPr lvl="2" eaLnBrk="1" latinLnBrk="0" hangingPunct="1"/>
             <a:r>
-              <a:rPr lang="en-US" smtClean="0"/>
+              <a:rPr lang="en-US"/>
               <a:t>Third level</a:t>
             </a:r>
           </a:p>
           <a:p>
             <a:pPr lvl="3" eaLnBrk="1" latinLnBrk="0" hangingPunct="1"/>
             <a:r>
-              <a:rPr lang="en-US" smtClean="0"/>
+              <a:rPr lang="en-US"/>
               <a:t>Fourth level</a:t>
             </a:r>
           </a:p>
           <a:p>
             <a:pPr lvl="4" eaLnBrk="1" latinLnBrk="0" hangingPunct="1"/>
             <a:r>
-              <a:rPr lang="en-US" smtClean="0"/>
+              <a:rPr lang="en-US"/>
               <a:t>Fifth level</a:t>
             </a:r>
             <a:endParaRPr kumimoji="0" lang="en-US"/>
@@ -973,14 +940,12 @@
         <p:spPr/>
         <p:txBody>
           <a:bodyPr/>
-          <a:lstStyle>
-            <a:extLst/>
-          </a:lstStyle>
+          <a:lstStyle/>
           <a:p>
             <a:fld id="{1371BCB6-6998-44A0-A399-0C960E52A424}" type="datetimeFigureOut">
               <a:rPr lang="en-NZ" smtClean="0"/>
               <a:pPr/>
-              <a:t>19/04/2018</a:t>
+              <a:t>20/04/2018</a:t>
             </a:fld>
             <a:endParaRPr lang="en-NZ"/>
           </a:p>
@@ -999,9 +964,7 @@
         <p:spPr/>
         <p:txBody>
           <a:bodyPr/>
-          <a:lstStyle>
-            <a:extLst/>
-          </a:lstStyle>
+          <a:lstStyle/>
           <a:p>
             <a:endParaRPr lang="en-NZ"/>
           </a:p>
@@ -1020,9 +983,7 @@
         <p:spPr/>
         <p:txBody>
           <a:bodyPr/>
-          <a:lstStyle>
-            <a:extLst/>
-          </a:lstStyle>
+          <a:lstStyle/>
           <a:p>
             <a:fld id="{9363C6AC-C3FC-43CA-88A8-777AF38E4C2C}" type="slidenum">
               <a:rPr lang="en-NZ" smtClean="0"/>
@@ -1076,15 +1037,12 @@
         </p:spPr>
         <p:txBody>
           <a:bodyPr vert="eaVert"/>
-          <a:lstStyle>
-            <a:extLst/>
-          </a:lstStyle>
-          <a:p>
-            <a:r>
-              <a:rPr kumimoji="0" lang="en-US" smtClean="0"/>
+          <a:lstStyle/>
+          <a:p>
+            <a:r>
+              <a:rPr kumimoji="0" lang="en-US"/>
               <a:t>Click to edit Master title style</a:t>
             </a:r>
-            <a:endParaRPr kumimoji="0" lang="en-US"/>
           </a:p>
         </p:txBody>
       </p:sp>
@@ -1106,41 +1064,39 @@
         </p:spPr>
         <p:txBody>
           <a:bodyPr vert="eaVert"/>
-          <a:lstStyle>
-            <a:extLst/>
-          </a:lstStyle>
+          <a:lstStyle/>
           <a:p>
             <a:pPr lvl="0" eaLnBrk="1" latinLnBrk="0" hangingPunct="1"/>
             <a:r>
-              <a:rPr lang="en-US" smtClean="0"/>
+              <a:rPr lang="en-US"/>
               <a:t>Click to edit Master text styles</a:t>
             </a:r>
           </a:p>
           <a:p>
             <a:pPr lvl="1" eaLnBrk="1" latinLnBrk="0" hangingPunct="1"/>
             <a:r>
-              <a:rPr lang="en-US" smtClean="0"/>
+              <a:rPr lang="en-US"/>
               <a:t>Second level</a:t>
             </a:r>
           </a:p>
           <a:p>
             <a:pPr lvl="2" eaLnBrk="1" latinLnBrk="0" hangingPunct="1"/>
             <a:r>
-              <a:rPr lang="en-US" smtClean="0"/>
+              <a:rPr lang="en-US"/>
               <a:t>Third level</a:t>
             </a:r>
           </a:p>
           <a:p>
             <a:pPr lvl="3" eaLnBrk="1" latinLnBrk="0" hangingPunct="1"/>
             <a:r>
-              <a:rPr lang="en-US" smtClean="0"/>
+              <a:rPr lang="en-US"/>
               <a:t>Fourth level</a:t>
             </a:r>
           </a:p>
           <a:p>
             <a:pPr lvl="4" eaLnBrk="1" latinLnBrk="0" hangingPunct="1"/>
             <a:r>
-              <a:rPr lang="en-US" smtClean="0"/>
+              <a:rPr lang="en-US"/>
               <a:t>Fifth level</a:t>
             </a:r>
             <a:endParaRPr kumimoji="0" lang="en-US"/>
@@ -1160,14 +1116,12 @@
         <p:spPr/>
         <p:txBody>
           <a:bodyPr/>
-          <a:lstStyle>
-            <a:extLst/>
-          </a:lstStyle>
+          <a:lstStyle/>
           <a:p>
             <a:fld id="{1371BCB6-6998-44A0-A399-0C960E52A424}" type="datetimeFigureOut">
               <a:rPr lang="en-NZ" smtClean="0"/>
               <a:pPr/>
-              <a:t>19/04/2018</a:t>
+              <a:t>20/04/2018</a:t>
             </a:fld>
             <a:endParaRPr lang="en-NZ"/>
           </a:p>
@@ -1186,9 +1140,7 @@
         <p:spPr/>
         <p:txBody>
           <a:bodyPr/>
-          <a:lstStyle>
-            <a:extLst/>
-          </a:lstStyle>
+          <a:lstStyle/>
           <a:p>
             <a:endParaRPr lang="en-NZ"/>
           </a:p>
@@ -1207,9 +1159,7 @@
         <p:spPr/>
         <p:txBody>
           <a:bodyPr/>
-          <a:lstStyle>
-            <a:extLst/>
-          </a:lstStyle>
+          <a:lstStyle/>
           <a:p>
             <a:fld id="{9363C6AC-C3FC-43CA-88A8-777AF38E4C2C}" type="slidenum">
               <a:rPr lang="en-NZ" smtClean="0"/>
@@ -1258,41 +1208,39 @@
         <p:spPr/>
         <p:txBody>
           <a:bodyPr/>
-          <a:lstStyle>
-            <a:extLst/>
-          </a:lstStyle>
+          <a:lstStyle/>
           <a:p>
             <a:pPr lvl="0" eaLnBrk="1" latinLnBrk="0" hangingPunct="1"/>
             <a:r>
-              <a:rPr lang="en-US" smtClean="0"/>
+              <a:rPr lang="en-US"/>
               <a:t>Click to edit Master text styles</a:t>
             </a:r>
           </a:p>
           <a:p>
             <a:pPr lvl="1" eaLnBrk="1" latinLnBrk="0" hangingPunct="1"/>
             <a:r>
-              <a:rPr lang="en-US" smtClean="0"/>
+              <a:rPr lang="en-US"/>
               <a:t>Second level</a:t>
             </a:r>
           </a:p>
           <a:p>
             <a:pPr lvl="2" eaLnBrk="1" latinLnBrk="0" hangingPunct="1"/>
             <a:r>
-              <a:rPr lang="en-US" smtClean="0"/>
+              <a:rPr lang="en-US"/>
               <a:t>Third level</a:t>
             </a:r>
           </a:p>
           <a:p>
             <a:pPr lvl="3" eaLnBrk="1" latinLnBrk="0" hangingPunct="1"/>
             <a:r>
-              <a:rPr lang="en-US" smtClean="0"/>
+              <a:rPr lang="en-US"/>
               <a:t>Fourth level</a:t>
             </a:r>
           </a:p>
           <a:p>
             <a:pPr lvl="4" eaLnBrk="1" latinLnBrk="0" hangingPunct="1"/>
             <a:r>
-              <a:rPr lang="en-US" smtClean="0"/>
+              <a:rPr lang="en-US"/>
               <a:t>Fifth level</a:t>
             </a:r>
             <a:endParaRPr kumimoji="0" lang="en-US"/>
@@ -1312,14 +1260,12 @@
         <p:spPr/>
         <p:txBody>
           <a:bodyPr/>
-          <a:lstStyle>
-            <a:extLst/>
-          </a:lstStyle>
+          <a:lstStyle/>
           <a:p>
             <a:fld id="{1371BCB6-6998-44A0-A399-0C960E52A424}" type="datetimeFigureOut">
               <a:rPr lang="en-NZ" smtClean="0"/>
               <a:pPr/>
-              <a:t>19/04/2018</a:t>
+              <a:t>20/04/2018</a:t>
             </a:fld>
             <a:endParaRPr lang="en-NZ"/>
           </a:p>
@@ -1338,9 +1284,7 @@
         <p:spPr/>
         <p:txBody>
           <a:bodyPr/>
-          <a:lstStyle>
-            <a:extLst/>
-          </a:lstStyle>
+          <a:lstStyle/>
           <a:p>
             <a:endParaRPr lang="en-NZ"/>
           </a:p>
@@ -1359,9 +1303,7 @@
         <p:spPr/>
         <p:txBody>
           <a:bodyPr/>
-          <a:lstStyle>
-            <a:extLst/>
-          </a:lstStyle>
+          <a:lstStyle/>
           <a:p>
             <a:fld id="{9363C6AC-C3FC-43CA-88A8-777AF38E4C2C}" type="slidenum">
               <a:rPr lang="en-NZ" smtClean="0"/>
@@ -1385,15 +1327,12 @@
         <p:spPr/>
         <p:txBody>
           <a:bodyPr rtlCol="0"/>
-          <a:lstStyle>
-            <a:extLst/>
-          </a:lstStyle>
-          <a:p>
-            <a:r>
-              <a:rPr kumimoji="0" lang="en-US" smtClean="0"/>
+          <a:lstStyle/>
+          <a:p>
+            <a:r>
+              <a:rPr kumimoji="0" lang="en-US"/>
               <a:t>Click to edit Master title style</a:t>
             </a:r>
-            <a:endParaRPr kumimoji="0" lang="en-US"/>
           </a:p>
         </p:txBody>
       </p:sp>
@@ -1471,10 +1410,9 @@
           </a:lstStyle>
           <a:p>
             <a:r>
-              <a:rPr kumimoji="0" lang="en-US" smtClean="0"/>
+              <a:rPr kumimoji="0" lang="en-US"/>
               <a:t>Click to edit Master title style</a:t>
             </a:r>
-            <a:endParaRPr kumimoji="0" lang="en-US"/>
           </a:p>
         </p:txBody>
       </p:sp>
@@ -1550,7 +1488,7 @@
           <a:p>
             <a:pPr lvl="0" eaLnBrk="1" latinLnBrk="0" hangingPunct="1"/>
             <a:r>
-              <a:rPr kumimoji="0" lang="en-US" smtClean="0"/>
+              <a:rPr kumimoji="0" lang="en-US"/>
               <a:t>Click to edit Master text styles</a:t>
             </a:r>
           </a:p>
@@ -1569,14 +1507,12 @@
         <p:spPr/>
         <p:txBody>
           <a:bodyPr/>
-          <a:lstStyle>
-            <a:extLst/>
-          </a:lstStyle>
+          <a:lstStyle/>
           <a:p>
             <a:fld id="{1371BCB6-6998-44A0-A399-0C960E52A424}" type="datetimeFigureOut">
               <a:rPr lang="en-NZ" smtClean="0"/>
               <a:pPr/>
-              <a:t>19/04/2018</a:t>
+              <a:t>20/04/2018</a:t>
             </a:fld>
             <a:endParaRPr lang="en-NZ"/>
           </a:p>
@@ -1595,9 +1531,7 @@
         <p:spPr/>
         <p:txBody>
           <a:bodyPr/>
-          <a:lstStyle>
-            <a:extLst/>
-          </a:lstStyle>
+          <a:lstStyle/>
           <a:p>
             <a:endParaRPr lang="en-NZ"/>
           </a:p>
@@ -1616,9 +1550,7 @@
         <p:spPr/>
         <p:txBody>
           <a:bodyPr/>
-          <a:lstStyle>
-            <a:extLst/>
-          </a:lstStyle>
+          <a:lstStyle/>
           <a:p>
             <a:fld id="{9363C6AC-C3FC-43CA-88A8-777AF38E4C2C}" type="slidenum">
               <a:rPr lang="en-NZ" smtClean="0"/>
@@ -1700,9 +1632,7 @@
         </p:style>
         <p:txBody>
           <a:bodyPr anchor="ctr"/>
-          <a:lstStyle>
-            <a:extLst/>
-          </a:lstStyle>
+          <a:lstStyle/>
           <a:p>
             <a:pPr algn="l" eaLnBrk="1" latinLnBrk="0" hangingPunct="1"/>
             <a:endParaRPr kumimoji="0" lang="en-US"/>
@@ -1780,9 +1710,7 @@
         </p:style>
         <p:txBody>
           <a:bodyPr anchor="ctr"/>
-          <a:lstStyle>
-            <a:extLst/>
-          </a:lstStyle>
+          <a:lstStyle/>
           <a:p>
             <a:pPr algn="l" eaLnBrk="1" latinLnBrk="0" hangingPunct="1"/>
             <a:endParaRPr kumimoji="0" lang="en-US"/>
@@ -1858,35 +1786,35 @@
           <a:p>
             <a:pPr lvl="0" eaLnBrk="1" latinLnBrk="0" hangingPunct="1"/>
             <a:r>
-              <a:rPr lang="en-US" smtClean="0"/>
+              <a:rPr lang="en-US"/>
               <a:t>Click to edit Master text styles</a:t>
             </a:r>
           </a:p>
           <a:p>
             <a:pPr lvl="1" eaLnBrk="1" latinLnBrk="0" hangingPunct="1"/>
             <a:r>
-              <a:rPr lang="en-US" smtClean="0"/>
+              <a:rPr lang="en-US"/>
               <a:t>Second level</a:t>
             </a:r>
           </a:p>
           <a:p>
             <a:pPr lvl="2" eaLnBrk="1" latinLnBrk="0" hangingPunct="1"/>
             <a:r>
-              <a:rPr lang="en-US" smtClean="0"/>
+              <a:rPr lang="en-US"/>
               <a:t>Third level</a:t>
             </a:r>
           </a:p>
           <a:p>
             <a:pPr lvl="3" eaLnBrk="1" latinLnBrk="0" hangingPunct="1"/>
             <a:r>
-              <a:rPr lang="en-US" smtClean="0"/>
+              <a:rPr lang="en-US"/>
               <a:t>Fourth level</a:t>
             </a:r>
           </a:p>
           <a:p>
             <a:pPr lvl="4" eaLnBrk="1" latinLnBrk="0" hangingPunct="1"/>
             <a:r>
-              <a:rPr lang="en-US" smtClean="0"/>
+              <a:rPr lang="en-US"/>
               <a:t>Fifth level</a:t>
             </a:r>
             <a:endParaRPr kumimoji="0" lang="en-US"/>
@@ -1932,35 +1860,35 @@
           <a:p>
             <a:pPr lvl="0" eaLnBrk="1" latinLnBrk="0" hangingPunct="1"/>
             <a:r>
-              <a:rPr lang="en-US" smtClean="0"/>
+              <a:rPr lang="en-US"/>
               <a:t>Click to edit Master text styles</a:t>
             </a:r>
           </a:p>
           <a:p>
             <a:pPr lvl="1" eaLnBrk="1" latinLnBrk="0" hangingPunct="1"/>
             <a:r>
-              <a:rPr lang="en-US" smtClean="0"/>
+              <a:rPr lang="en-US"/>
               <a:t>Second level</a:t>
             </a:r>
           </a:p>
           <a:p>
             <a:pPr lvl="2" eaLnBrk="1" latinLnBrk="0" hangingPunct="1"/>
             <a:r>
-              <a:rPr lang="en-US" smtClean="0"/>
+              <a:rPr lang="en-US"/>
               <a:t>Third level</a:t>
             </a:r>
           </a:p>
           <a:p>
             <a:pPr lvl="3" eaLnBrk="1" latinLnBrk="0" hangingPunct="1"/>
             <a:r>
-              <a:rPr lang="en-US" smtClean="0"/>
+              <a:rPr lang="en-US"/>
               <a:t>Fourth level</a:t>
             </a:r>
           </a:p>
           <a:p>
             <a:pPr lvl="4" eaLnBrk="1" latinLnBrk="0" hangingPunct="1"/>
             <a:r>
-              <a:rPr lang="en-US" smtClean="0"/>
+              <a:rPr lang="en-US"/>
               <a:t>Fifth level</a:t>
             </a:r>
             <a:endParaRPr kumimoji="0" lang="en-US"/>
@@ -1980,14 +1908,12 @@
         <p:spPr/>
         <p:txBody>
           <a:bodyPr/>
-          <a:lstStyle>
-            <a:extLst/>
-          </a:lstStyle>
+          <a:lstStyle/>
           <a:p>
             <a:fld id="{1371BCB6-6998-44A0-A399-0C960E52A424}" type="datetimeFigureOut">
               <a:rPr lang="en-NZ" smtClean="0"/>
               <a:pPr/>
-              <a:t>19/04/2018</a:t>
+              <a:t>20/04/2018</a:t>
             </a:fld>
             <a:endParaRPr lang="en-NZ"/>
           </a:p>
@@ -2006,9 +1932,7 @@
         <p:spPr/>
         <p:txBody>
           <a:bodyPr/>
-          <a:lstStyle>
-            <a:extLst/>
-          </a:lstStyle>
+          <a:lstStyle/>
           <a:p>
             <a:endParaRPr lang="en-NZ"/>
           </a:p>
@@ -2027,9 +1951,7 @@
         <p:spPr/>
         <p:txBody>
           <a:bodyPr/>
-          <a:lstStyle>
-            <a:extLst/>
-          </a:lstStyle>
+          <a:lstStyle/>
           <a:p>
             <a:fld id="{9363C6AC-C3FC-43CA-88A8-777AF38E4C2C}" type="slidenum">
               <a:rPr lang="en-NZ" smtClean="0"/>
@@ -2053,15 +1975,12 @@
         <p:spPr/>
         <p:txBody>
           <a:bodyPr rtlCol="0"/>
-          <a:lstStyle>
-            <a:extLst/>
-          </a:lstStyle>
-          <a:p>
-            <a:r>
-              <a:rPr kumimoji="0" lang="en-US" smtClean="0"/>
+          <a:lstStyle/>
+          <a:p>
+            <a:r>
+              <a:rPr kumimoji="0" lang="en-US"/>
               <a:t>Click to edit Master title style</a:t>
             </a:r>
-            <a:endParaRPr kumimoji="0" lang="en-US"/>
           </a:p>
         </p:txBody>
       </p:sp>
@@ -2121,10 +2040,9 @@
           </a:lstStyle>
           <a:p>
             <a:r>
-              <a:rPr kumimoji="0" lang="en-US" smtClean="0"/>
+              <a:rPr kumimoji="0" lang="en-US"/>
               <a:t>Click to edit Master title style</a:t>
             </a:r>
-            <a:endParaRPr kumimoji="0" lang="en-US"/>
           </a:p>
         </p:txBody>
       </p:sp>
@@ -2185,7 +2103,7 @@
           <a:p>
             <a:pPr lvl="0" eaLnBrk="1" latinLnBrk="0" hangingPunct="1"/>
             <a:r>
-              <a:rPr kumimoji="0" lang="en-US" smtClean="0"/>
+              <a:rPr kumimoji="0" lang="en-US"/>
               <a:t>Click to edit Master text styles</a:t>
             </a:r>
           </a:p>
@@ -2248,7 +2166,7 @@
           <a:p>
             <a:pPr lvl="0" eaLnBrk="1" latinLnBrk="0" hangingPunct="1"/>
             <a:r>
-              <a:rPr kumimoji="0" lang="en-US" smtClean="0"/>
+              <a:rPr kumimoji="0" lang="en-US"/>
               <a:t>Click to edit Master text styles</a:t>
             </a:r>
           </a:p>
@@ -2298,35 +2216,35 @@
           <a:p>
             <a:pPr lvl="0" eaLnBrk="1" latinLnBrk="0" hangingPunct="1"/>
             <a:r>
-              <a:rPr lang="en-US" smtClean="0"/>
+              <a:rPr lang="en-US"/>
               <a:t>Click to edit Master text styles</a:t>
             </a:r>
           </a:p>
           <a:p>
             <a:pPr lvl="1" eaLnBrk="1" latinLnBrk="0" hangingPunct="1"/>
             <a:r>
-              <a:rPr lang="en-US" smtClean="0"/>
+              <a:rPr lang="en-US"/>
               <a:t>Second level</a:t>
             </a:r>
           </a:p>
           <a:p>
             <a:pPr lvl="2" eaLnBrk="1" latinLnBrk="0" hangingPunct="1"/>
             <a:r>
-              <a:rPr lang="en-US" smtClean="0"/>
+              <a:rPr lang="en-US"/>
               <a:t>Third level</a:t>
             </a:r>
           </a:p>
           <a:p>
             <a:pPr lvl="3" eaLnBrk="1" latinLnBrk="0" hangingPunct="1"/>
             <a:r>
-              <a:rPr lang="en-US" smtClean="0"/>
+              <a:rPr lang="en-US"/>
               <a:t>Fourth level</a:t>
             </a:r>
           </a:p>
           <a:p>
             <a:pPr lvl="4" eaLnBrk="1" latinLnBrk="0" hangingPunct="1"/>
             <a:r>
-              <a:rPr lang="en-US" smtClean="0"/>
+              <a:rPr lang="en-US"/>
               <a:t>Fifth level</a:t>
             </a:r>
             <a:endParaRPr kumimoji="0" lang="en-US"/>
@@ -2380,35 +2298,35 @@
           <a:p>
             <a:pPr lvl="0" eaLnBrk="1" latinLnBrk="0" hangingPunct="1"/>
             <a:r>
-              <a:rPr lang="en-US" smtClean="0"/>
+              <a:rPr lang="en-US"/>
               <a:t>Click to edit Master text styles</a:t>
             </a:r>
           </a:p>
           <a:p>
             <a:pPr lvl="1" eaLnBrk="1" latinLnBrk="0" hangingPunct="1"/>
             <a:r>
-              <a:rPr lang="en-US" smtClean="0"/>
+              <a:rPr lang="en-US"/>
               <a:t>Second level</a:t>
             </a:r>
           </a:p>
           <a:p>
             <a:pPr lvl="2" eaLnBrk="1" latinLnBrk="0" hangingPunct="1"/>
             <a:r>
-              <a:rPr lang="en-US" smtClean="0"/>
+              <a:rPr lang="en-US"/>
               <a:t>Third level</a:t>
             </a:r>
           </a:p>
           <a:p>
             <a:pPr lvl="3" eaLnBrk="1" latinLnBrk="0" hangingPunct="1"/>
             <a:r>
-              <a:rPr lang="en-US" smtClean="0"/>
+              <a:rPr lang="en-US"/>
               <a:t>Fourth level</a:t>
             </a:r>
           </a:p>
           <a:p>
             <a:pPr lvl="4" eaLnBrk="1" latinLnBrk="0" hangingPunct="1"/>
             <a:r>
-              <a:rPr lang="en-US" smtClean="0"/>
+              <a:rPr lang="en-US"/>
               <a:t>Fifth level</a:t>
             </a:r>
             <a:endParaRPr kumimoji="0" lang="en-US"/>
@@ -2428,14 +2346,12 @@
         <p:spPr/>
         <p:txBody>
           <a:bodyPr/>
-          <a:lstStyle>
-            <a:extLst/>
-          </a:lstStyle>
+          <a:lstStyle/>
           <a:p>
             <a:fld id="{1371BCB6-6998-44A0-A399-0C960E52A424}" type="datetimeFigureOut">
               <a:rPr lang="en-NZ" smtClean="0"/>
               <a:pPr/>
-              <a:t>19/04/2018</a:t>
+              <a:t>20/04/2018</a:t>
             </a:fld>
             <a:endParaRPr lang="en-NZ"/>
           </a:p>
@@ -2454,9 +2370,7 @@
         <p:spPr/>
         <p:txBody>
           <a:bodyPr/>
-          <a:lstStyle>
-            <a:extLst/>
-          </a:lstStyle>
+          <a:lstStyle/>
           <a:p>
             <a:endParaRPr lang="en-NZ"/>
           </a:p>
@@ -2475,9 +2389,7 @@
         <p:spPr/>
         <p:txBody>
           <a:bodyPr/>
-          <a:lstStyle>
-            <a:extLst/>
-          </a:lstStyle>
+          <a:lstStyle/>
           <a:p>
             <a:fld id="{9363C6AC-C3FC-43CA-88A8-777AF38E4C2C}" type="slidenum">
               <a:rPr lang="en-NZ" smtClean="0"/>
@@ -2531,14 +2443,12 @@
         <p:spPr/>
         <p:txBody>
           <a:bodyPr/>
-          <a:lstStyle>
-            <a:extLst/>
-          </a:lstStyle>
+          <a:lstStyle/>
           <a:p>
             <a:fld id="{1371BCB6-6998-44A0-A399-0C960E52A424}" type="datetimeFigureOut">
               <a:rPr lang="en-NZ" smtClean="0"/>
               <a:pPr/>
-              <a:t>19/04/2018</a:t>
+              <a:t>20/04/2018</a:t>
             </a:fld>
             <a:endParaRPr lang="en-NZ"/>
           </a:p>
@@ -2557,9 +2467,7 @@
         <p:spPr/>
         <p:txBody>
           <a:bodyPr/>
-          <a:lstStyle>
-            <a:extLst/>
-          </a:lstStyle>
+          <a:lstStyle/>
           <a:p>
             <a:endParaRPr lang="en-NZ"/>
           </a:p>
@@ -2578,9 +2486,7 @@
         <p:spPr/>
         <p:txBody>
           <a:bodyPr/>
-          <a:lstStyle>
-            <a:extLst/>
-          </a:lstStyle>
+          <a:lstStyle/>
           <a:p>
             <a:fld id="{9363C6AC-C3FC-43CA-88A8-777AF38E4C2C}" type="slidenum">
               <a:rPr lang="en-NZ" smtClean="0"/>
@@ -2604,15 +2510,12 @@
         <p:spPr/>
         <p:txBody>
           <a:bodyPr rtlCol="0"/>
-          <a:lstStyle>
-            <a:extLst/>
-          </a:lstStyle>
-          <a:p>
-            <a:r>
-              <a:rPr kumimoji="0" lang="en-US" smtClean="0"/>
+          <a:lstStyle/>
+          <a:p>
+            <a:r>
+              <a:rPr kumimoji="0" lang="en-US"/>
               <a:t>Click to edit Master title style</a:t>
             </a:r>
-            <a:endParaRPr kumimoji="0" lang="en-US"/>
           </a:p>
         </p:txBody>
       </p:sp>
@@ -2654,14 +2557,12 @@
         <p:spPr/>
         <p:txBody>
           <a:bodyPr/>
-          <a:lstStyle>
-            <a:extLst/>
-          </a:lstStyle>
+          <a:lstStyle/>
           <a:p>
             <a:fld id="{1371BCB6-6998-44A0-A399-0C960E52A424}" type="datetimeFigureOut">
               <a:rPr lang="en-NZ" smtClean="0"/>
               <a:pPr/>
-              <a:t>19/04/2018</a:t>
+              <a:t>20/04/2018</a:t>
             </a:fld>
             <a:endParaRPr lang="en-NZ"/>
           </a:p>
@@ -2680,9 +2581,7 @@
         <p:spPr/>
         <p:txBody>
           <a:bodyPr/>
-          <a:lstStyle>
-            <a:extLst/>
-          </a:lstStyle>
+          <a:lstStyle/>
           <a:p>
             <a:endParaRPr lang="en-NZ"/>
           </a:p>
@@ -2701,9 +2600,7 @@
         <p:spPr/>
         <p:txBody>
           <a:bodyPr/>
-          <a:lstStyle>
-            <a:extLst/>
-          </a:lstStyle>
+          <a:lstStyle/>
           <a:p>
             <a:fld id="{9363C6AC-C3FC-43CA-88A8-777AF38E4C2C}" type="slidenum">
               <a:rPr lang="en-NZ" smtClean="0"/>
@@ -2781,10 +2678,9 @@
           </a:lstStyle>
           <a:p>
             <a:r>
-              <a:rPr kumimoji="0" lang="en-US" smtClean="0"/>
+              <a:rPr kumimoji="0" lang="en-US"/>
               <a:t>Click to edit Master title style</a:t>
             </a:r>
-            <a:endParaRPr kumimoji="0" lang="en-US"/>
           </a:p>
         </p:txBody>
       </p:sp>
@@ -2832,7 +2728,7 @@
           <a:p>
             <a:pPr lvl="0" eaLnBrk="1" latinLnBrk="0" hangingPunct="1"/>
             <a:r>
-              <a:rPr kumimoji="0" lang="en-US" smtClean="0"/>
+              <a:rPr kumimoji="0" lang="en-US"/>
               <a:t>Click to edit Master text styles</a:t>
             </a:r>
           </a:p>
@@ -2877,35 +2773,35 @@
           <a:p>
             <a:pPr lvl="0" eaLnBrk="1" latinLnBrk="0" hangingPunct="1"/>
             <a:r>
-              <a:rPr lang="en-US" smtClean="0"/>
+              <a:rPr lang="en-US"/>
               <a:t>Click to edit Master text styles</a:t>
             </a:r>
           </a:p>
           <a:p>
             <a:pPr lvl="1" eaLnBrk="1" latinLnBrk="0" hangingPunct="1"/>
             <a:r>
-              <a:rPr lang="en-US" smtClean="0"/>
+              <a:rPr lang="en-US"/>
               <a:t>Second level</a:t>
             </a:r>
           </a:p>
           <a:p>
             <a:pPr lvl="2" eaLnBrk="1" latinLnBrk="0" hangingPunct="1"/>
             <a:r>
-              <a:rPr lang="en-US" smtClean="0"/>
+              <a:rPr lang="en-US"/>
               <a:t>Third level</a:t>
             </a:r>
           </a:p>
           <a:p>
             <a:pPr lvl="3" eaLnBrk="1" latinLnBrk="0" hangingPunct="1"/>
             <a:r>
-              <a:rPr lang="en-US" smtClean="0"/>
+              <a:rPr lang="en-US"/>
               <a:t>Fourth level</a:t>
             </a:r>
           </a:p>
           <a:p>
             <a:pPr lvl="4" eaLnBrk="1" latinLnBrk="0" hangingPunct="1"/>
             <a:r>
-              <a:rPr lang="en-US" smtClean="0"/>
+              <a:rPr lang="en-US"/>
               <a:t>Fifth level</a:t>
             </a:r>
             <a:endParaRPr kumimoji="0" lang="en-US"/>
@@ -2930,14 +2826,12 @@
         </p:spPr>
         <p:txBody>
           <a:bodyPr/>
-          <a:lstStyle>
-            <a:extLst/>
-          </a:lstStyle>
+          <a:lstStyle/>
           <a:p>
             <a:fld id="{1371BCB6-6998-44A0-A399-0C960E52A424}" type="datetimeFigureOut">
               <a:rPr lang="en-NZ" smtClean="0"/>
               <a:pPr/>
-              <a:t>19/04/2018</a:t>
+              <a:t>20/04/2018</a:t>
             </a:fld>
             <a:endParaRPr lang="en-NZ"/>
           </a:p>
@@ -2956,9 +2850,7 @@
         <p:spPr/>
         <p:txBody>
           <a:bodyPr/>
-          <a:lstStyle>
-            <a:extLst/>
-          </a:lstStyle>
+          <a:lstStyle/>
           <a:p>
             <a:endParaRPr lang="en-NZ"/>
           </a:p>
@@ -2977,9 +2869,7 @@
         <p:spPr/>
         <p:txBody>
           <a:bodyPr/>
-          <a:lstStyle>
-            <a:extLst/>
-          </a:lstStyle>
+          <a:lstStyle/>
           <a:p>
             <a:fld id="{9363C6AC-C3FC-43CA-88A8-777AF38E4C2C}" type="slidenum">
               <a:rPr lang="en-NZ" smtClean="0"/>
@@ -3061,7 +2951,7 @@
           <a:p>
             <a:pPr lvl="0" eaLnBrk="1" latinLnBrk="0" hangingPunct="1"/>
             <a:r>
-              <a:rPr kumimoji="0" lang="en-US" smtClean="0"/>
+              <a:rPr kumimoji="0" lang="en-US"/>
               <a:t>Click to edit Master text styles</a:t>
             </a:r>
           </a:p>
@@ -3110,7 +3000,7 @@
           </a:lstStyle>
           <a:p>
             <a:r>
-              <a:rPr kumimoji="0" lang="en-US" smtClean="0"/>
+              <a:rPr kumimoji="0" lang="en-US"/>
               <a:t>Click icon to add picture</a:t>
             </a:r>
             <a:endParaRPr kumimoji="0" lang="en-US" dirty="0"/>
@@ -3144,7 +3034,7 @@
             <a:fld id="{1371BCB6-6998-44A0-A399-0C960E52A424}" type="datetimeFigureOut">
               <a:rPr lang="en-NZ" smtClean="0"/>
               <a:pPr/>
-              <a:t>19/04/2018</a:t>
+              <a:t>20/04/2018</a:t>
             </a:fld>
             <a:endParaRPr lang="en-NZ"/>
           </a:p>
@@ -3257,10 +3147,9 @@
           </a:lstStyle>
           <a:p>
             <a:r>
-              <a:rPr kumimoji="0" lang="en-US" smtClean="0"/>
+              <a:rPr kumimoji="0" lang="en-US"/>
               <a:t>Click to edit Master title style</a:t>
             </a:r>
-            <a:endParaRPr kumimoji="0" lang="en-US"/>
           </a:p>
         </p:txBody>
       </p:sp>
@@ -3340,9 +3229,7 @@
         </p:spPr>
         <p:txBody>
           <a:bodyPr vert="horz" wrap="square" lIns="91440" tIns="45720" rIns="91440" bIns="45720" anchor="t" compatLnSpc="1"/>
-          <a:lstStyle>
-            <a:extLst/>
-          </a:lstStyle>
+          <a:lstStyle/>
           <a:p>
             <a:endParaRPr kumimoji="0" lang="en-US"/>
           </a:p>
@@ -3422,9 +3309,7 @@
         </p:spPr>
         <p:txBody>
           <a:bodyPr vert="horz" wrap="square" lIns="91440" tIns="45720" rIns="91440" bIns="45720" anchor="t" compatLnSpc="1"/>
-          <a:lstStyle>
-            <a:extLst/>
-          </a:lstStyle>
+          <a:lstStyle/>
           <a:p>
             <a:endParaRPr kumimoji="0" lang="en-US"/>
           </a:p>
@@ -3532,9 +3417,7 @@
         </p:style>
         <p:txBody>
           <a:bodyPr vert="horz" wrap="square" lIns="91440" tIns="45720" rIns="91440" bIns="45720" anchor="ctr" compatLnSpc="1"/>
-          <a:lstStyle>
-            <a:extLst/>
-          </a:lstStyle>
+          <a:lstStyle/>
           <a:p>
             <a:pPr algn="ctr" eaLnBrk="1" latinLnBrk="0" hangingPunct="1"/>
             <a:endParaRPr kumimoji="0" lang="en-US"/>
@@ -3665,9 +3548,7 @@
         </p:style>
         <p:txBody>
           <a:bodyPr anchor="ctr"/>
-          <a:lstStyle>
-            <a:extLst/>
-          </a:lstStyle>
+          <a:lstStyle/>
           <a:p>
             <a:pPr algn="l" eaLnBrk="1" latinLnBrk="0" hangingPunct="1"/>
             <a:endParaRPr kumimoji="0" lang="en-US"/>
@@ -3745,9 +3626,7 @@
         </p:style>
         <p:txBody>
           <a:bodyPr anchor="ctr"/>
-          <a:lstStyle>
-            <a:extLst/>
-          </a:lstStyle>
+          <a:lstStyle/>
           <a:p>
             <a:pPr algn="l" eaLnBrk="1" latinLnBrk="0" hangingPunct="1"/>
             <a:endParaRPr kumimoji="0" lang="en-US"/>
@@ -3860,9 +3739,7 @@
         </p:spPr>
         <p:txBody>
           <a:bodyPr vert="horz" wrap="square" lIns="91440" tIns="45720" rIns="91440" bIns="45720" anchor="t" compatLnSpc="1"/>
-          <a:lstStyle>
-            <a:extLst/>
-          </a:lstStyle>
+          <a:lstStyle/>
           <a:p>
             <a:endParaRPr kumimoji="0" lang="en-US"/>
           </a:p>
@@ -3942,9 +3819,7 @@
         </p:spPr>
         <p:txBody>
           <a:bodyPr vert="horz" wrap="square" lIns="91440" tIns="45720" rIns="91440" bIns="45720" anchor="t" compatLnSpc="1"/>
-          <a:lstStyle>
-            <a:extLst/>
-          </a:lstStyle>
+          <a:lstStyle/>
           <a:p>
             <a:endParaRPr kumimoji="0" lang="en-US"/>
           </a:p>
@@ -4052,9 +3927,7 @@
         </p:style>
         <p:txBody>
           <a:bodyPr vert="horz" wrap="square" lIns="91440" tIns="45720" rIns="91440" bIns="45720" anchor="ctr" compatLnSpc="1"/>
-          <a:lstStyle>
-            <a:extLst/>
-          </a:lstStyle>
+          <a:lstStyle/>
           <a:p>
             <a:pPr algn="ctr" eaLnBrk="1" latinLnBrk="0" hangingPunct="1"/>
             <a:endParaRPr kumimoji="0" lang="en-US"/>
@@ -4144,15 +4017,12 @@
               <a:bevelT w="25400" h="25400"/>
             </a:sp3d>
           </a:bodyPr>
-          <a:lstStyle>
-            <a:extLst/>
-          </a:lstStyle>
-          <a:p>
-            <a:r>
-              <a:rPr kumimoji="0" lang="en-US" smtClean="0"/>
+          <a:lstStyle/>
+          <a:p>
+            <a:r>
+              <a:rPr kumimoji="0" lang="en-US"/>
               <a:t>Click to edit Master title style</a:t>
             </a:r>
-            <a:endParaRPr kumimoji="0" lang="en-US"/>
           </a:p>
         </p:txBody>
       </p:sp>
@@ -4179,44 +4049,41 @@
           <a:bodyPr vert="horz">
             <a:normAutofit/>
           </a:bodyPr>
-          <a:lstStyle>
-            <a:extLst/>
-          </a:lstStyle>
+          <a:lstStyle/>
           <a:p>
             <a:pPr lvl="0" eaLnBrk="1" latinLnBrk="0" hangingPunct="1"/>
             <a:r>
-              <a:rPr kumimoji="0" lang="en-US" smtClean="0"/>
+              <a:rPr kumimoji="0" lang="en-US"/>
               <a:t>Click to edit Master text styles</a:t>
             </a:r>
           </a:p>
           <a:p>
             <a:pPr lvl="1" eaLnBrk="1" latinLnBrk="0" hangingPunct="1"/>
             <a:r>
-              <a:rPr kumimoji="0" lang="en-US" smtClean="0"/>
+              <a:rPr kumimoji="0" lang="en-US"/>
               <a:t>Second level</a:t>
             </a:r>
           </a:p>
           <a:p>
             <a:pPr lvl="2" eaLnBrk="1" latinLnBrk="0" hangingPunct="1"/>
             <a:r>
-              <a:rPr kumimoji="0" lang="en-US" smtClean="0"/>
+              <a:rPr kumimoji="0" lang="en-US"/>
               <a:t>Third level</a:t>
             </a:r>
           </a:p>
           <a:p>
             <a:pPr lvl="3" eaLnBrk="1" latinLnBrk="0" hangingPunct="1"/>
             <a:r>
-              <a:rPr kumimoji="0" lang="en-US" smtClean="0"/>
+              <a:rPr kumimoji="0" lang="en-US"/>
               <a:t>Fourth level</a:t>
             </a:r>
           </a:p>
           <a:p>
             <a:pPr lvl="4" eaLnBrk="1" latinLnBrk="0" hangingPunct="1"/>
             <a:r>
-              <a:rPr kumimoji="0" lang="en-US" smtClean="0"/>
+              <a:rPr kumimoji="0" lang="en-US"/>
               <a:t>Fifth level</a:t>
             </a:r>
-            <a:endParaRPr kumimoji="0" lang="en-US"/>
           </a:p>
         </p:txBody>
       </p:sp>
@@ -4255,7 +4122,7 @@
             <a:fld id="{1371BCB6-6998-44A0-A399-0C960E52A424}" type="datetimeFigureOut">
               <a:rPr lang="en-NZ" smtClean="0"/>
               <a:pPr/>
-              <a:t>19/04/2018</a:t>
+              <a:t>20/04/2018</a:t>
             </a:fld>
             <a:endParaRPr lang="en-NZ"/>
           </a:p>
@@ -4681,32 +4548,27 @@
           <a:lstStyle/>
           <a:p>
             <a:r>
-              <a:rPr lang="en-NZ" dirty="0" smtClean="0"/>
+              <a:rPr lang="en-NZ" dirty="0"/>
               <a:t/>
             </a:r>
             <a:br>
-              <a:rPr lang="en-NZ" dirty="0" smtClean="0"/>
+              <a:rPr lang="en-NZ" dirty="0"/>
             </a:br>
             <a:r>
-              <a:rPr lang="en-NZ" dirty="0" smtClean="0"/>
-              <a:t> Designing an Object Detection System on </a:t>
-            </a:r>
-            <a:r>
-              <a:rPr lang="en-NZ" dirty="0" smtClean="0"/>
-              <a:t>Chip</a:t>
+              <a:rPr lang="en-NZ" dirty="0"/>
+              <a:t> Designing an Object Detection System</a:t>
             </a:r>
             <a:br>
-              <a:rPr lang="en-NZ" dirty="0" smtClean="0"/>
+              <a:rPr lang="en-NZ" dirty="0"/>
             </a:br>
             <a:r>
-              <a:rPr lang="en-NZ" sz="4400" dirty="0" smtClean="0"/>
+              <a:rPr lang="en-NZ" sz="4400" dirty="0"/>
               <a:t>Phase 1</a:t>
             </a:r>
             <a:r>
-              <a:rPr lang="en-NZ" dirty="0" smtClean="0"/>
+              <a:rPr lang="en-NZ" dirty="0"/>
               <a:t> </a:t>
             </a:r>
-            <a:endParaRPr lang="en-NZ" dirty="0"/>
           </a:p>
         </p:txBody>
       </p:sp>
@@ -4726,10 +4588,9 @@
           <a:lstStyle/>
           <a:p>
             <a:r>
-              <a:rPr lang="en-NZ" dirty="0" smtClean="0"/>
+              <a:rPr lang="en-NZ" dirty="0"/>
               <a:t>Group 4</a:t>
             </a:r>
-            <a:endParaRPr lang="en-NZ" dirty="0"/>
           </a:p>
         </p:txBody>
       </p:sp>
@@ -4774,36 +4635,28 @@
           <a:lstStyle/>
           <a:p>
             <a:r>
-              <a:rPr lang="en-NZ" dirty="0" smtClean="0"/>
+              <a:rPr lang="en-NZ" dirty="0"/>
               <a:t>Key Setup Module</a:t>
             </a:r>
           </a:p>
           <a:p>
             <a:pPr lvl="1"/>
             <a:r>
-              <a:rPr lang="en-NZ" dirty="0" smtClean="0"/>
+              <a:rPr lang="en-NZ" dirty="0"/>
               <a:t>Computes initial internal state</a:t>
             </a:r>
           </a:p>
           <a:p>
             <a:r>
-              <a:rPr lang="en-NZ" dirty="0" smtClean="0"/>
+              <a:rPr lang="en-NZ" dirty="0"/>
               <a:t>Cipher Module</a:t>
             </a:r>
           </a:p>
           <a:p>
             <a:pPr lvl="1"/>
             <a:r>
-              <a:rPr lang="en-NZ" dirty="0" smtClean="0"/>
-              <a:t>Generates </a:t>
-            </a:r>
-            <a:r>
               <a:rPr lang="en-NZ" dirty="0"/>
-              <a:t>cipher </a:t>
-            </a:r>
-            <a:r>
-              <a:rPr lang="en-NZ" dirty="0" smtClean="0"/>
-              <a:t>stream</a:t>
+              <a:t>Generates cipher stream</a:t>
             </a:r>
           </a:p>
           <a:p>
@@ -4812,21 +4665,21 @@
           </a:p>
           <a:p>
             <a:r>
-              <a:rPr lang="en-NZ" dirty="0" smtClean="0"/>
+              <a:rPr lang="en-NZ" dirty="0"/>
               <a:t>Trivium Module</a:t>
             </a:r>
           </a:p>
           <a:p>
             <a:pPr lvl="1"/>
             <a:r>
-              <a:rPr lang="en-NZ" dirty="0" smtClean="0"/>
+              <a:rPr lang="en-NZ" dirty="0"/>
               <a:t>Overall module</a:t>
             </a:r>
           </a:p>
           <a:p>
             <a:pPr lvl="1"/>
             <a:r>
-              <a:rPr lang="en-NZ" dirty="0" smtClean="0"/>
+              <a:rPr lang="en-NZ" dirty="0"/>
               <a:t>Output stream = input stream XOR cipher stream</a:t>
             </a:r>
           </a:p>
@@ -4854,17 +4707,16 @@
           <a:lstStyle/>
           <a:p>
             <a:r>
-              <a:rPr lang="en-NZ" dirty="0" smtClean="0"/>
+              <a:rPr lang="en-NZ" dirty="0"/>
               <a:t>Implementation</a:t>
             </a:r>
-            <a:endParaRPr lang="en-NZ" dirty="0"/>
           </a:p>
         </p:txBody>
       </p:sp>
     </p:spTree>
     <p:extLst>
       <p:ext uri="{BB962C8B-B14F-4D97-AF65-F5344CB8AC3E}">
-        <p14:creationId xmlns:p14="http://schemas.microsoft.com/office/powerpoint/2010/main" val="1713689211"/>
+        <p14:creationId xmlns:p14="http://schemas.microsoft.com/office/powerpoint/2010/main" xmlns="" val="1713689211"/>
       </p:ext>
     </p:extLst>
   </p:cSld>
@@ -4932,10 +4784,9 @@
           <a:lstStyle/>
           <a:p>
             <a:r>
-              <a:rPr lang="en-NZ" dirty="0" smtClean="0"/>
+              <a:rPr lang="en-NZ" dirty="0"/>
               <a:t>Simulation Results</a:t>
             </a:r>
-            <a:endParaRPr lang="en-NZ" dirty="0"/>
           </a:p>
         </p:txBody>
       </p:sp>
@@ -4990,12 +4841,12 @@
       </p:grpSpPr>
       <p:sp>
         <p:nvSpPr>
-          <p:cNvPr id="2" name="Content Placeholder 1"/>
-          <p:cNvSpPr>
-            <a:spLocks noGrp="1"/>
-          </p:cNvSpPr>
-          <p:nvPr>
-            <p:ph idx="1"/>
+          <p:cNvPr id="3" name="Title 2"/>
+          <p:cNvSpPr>
+            <a:spLocks noGrp="1"/>
+          </p:cNvSpPr>
+          <p:nvPr>
+            <p:ph type="title"/>
           </p:nvPr>
         </p:nvSpPr>
         <p:spPr/>
@@ -5004,62 +4855,71 @@
           <a:lstStyle/>
           <a:p>
             <a:r>
-              <a:rPr lang="en-NZ" b="1" u="sng" dirty="0" err="1" smtClean="0"/>
-              <a:t>Sak</a:t>
-            </a:r>
-            <a:r>
-              <a:rPr lang="en-NZ" b="1" u="sng" dirty="0" smtClean="0"/>
-              <a:t>, I hope you got our </a:t>
-            </a:r>
-            <a:r>
-              <a:rPr lang="en-NZ" b="1" u="sng" dirty="0" err="1" smtClean="0"/>
-              <a:t>bak</a:t>
-            </a:r>
-            <a:endParaRPr lang="en-NZ" b="1" u="sng" dirty="0" smtClean="0"/>
-          </a:p>
-          <a:p>
-            <a:endParaRPr lang="en-NZ" dirty="0" smtClean="0"/>
-          </a:p>
-          <a:p>
-            <a:pPr lvl="0"/>
-            <a:endParaRPr lang="en-NZ" i="1" dirty="0" smtClean="0"/>
-          </a:p>
-          <a:p>
-            <a:pPr lvl="0"/>
-            <a:r>
-              <a:rPr lang="en-NZ" i="1" dirty="0" smtClean="0"/>
-              <a:t>Performance comparison (with or without the communication overhead, this could include theoretical calculations based on operating frequency and required number of cycles)</a:t>
-            </a:r>
-          </a:p>
-        </p:txBody>
-      </p:sp>
-      <p:sp>
-        <p:nvSpPr>
-          <p:cNvPr id="3" name="Title 2"/>
-          <p:cNvSpPr>
-            <a:spLocks noGrp="1"/>
-          </p:cNvSpPr>
-          <p:nvPr>
-            <p:ph type="title"/>
-          </p:nvPr>
-        </p:nvSpPr>
-        <p:spPr/>
-        <p:txBody>
-          <a:bodyPr/>
-          <a:lstStyle/>
-          <a:p>
-            <a:r>
-              <a:rPr lang="en-NZ" dirty="0" smtClean="0"/>
-              <a:t>Performance </a:t>
-            </a:r>
-            <a:r>
-              <a:rPr lang="en-NZ" dirty="0" smtClean="0"/>
-              <a:t>Comparison </a:t>
-            </a:r>
-            <a:endParaRPr lang="en-NZ" dirty="0"/>
-          </a:p>
-        </p:txBody>
-      </p:sp>
+              <a:rPr lang="en-NZ" dirty="0"/>
+              <a:t>Performance Comparison </a:t>
+            </a:r>
+          </a:p>
+        </p:txBody>
+      </p:sp>
+      <p:pic>
+        <p:nvPicPr>
+          <p:cNvPr id="4" name="Picture 3">
+            <a:extLst>
+              <a:ext uri="{FF2B5EF4-FFF2-40B4-BE49-F238E27FC236}">
+                <a16:creationId xmlns:a16="http://schemas.microsoft.com/office/drawing/2014/main" xmlns="" id="{9FDEAC03-B70B-49AB-89EE-E18DFD92E046}"/>
+              </a:ext>
+            </a:extLst>
+          </p:cNvPr>
+          <p:cNvPicPr>
+            <a:picLocks noChangeAspect="1"/>
+          </p:cNvPicPr>
+          <p:nvPr/>
+        </p:nvPicPr>
+        <p:blipFill rotWithShape="1">
+          <a:blip r:embed="rId2" cstate="print"/>
+          <a:srcRect l="669"/>
+          <a:stretch/>
+        </p:blipFill>
+        <p:spPr>
+          <a:xfrm>
+            <a:off x="457200" y="1398864"/>
+            <a:ext cx="5799732" cy="2847975"/>
+          </a:xfrm>
+          <a:prstGeom prst="rect">
+            <a:avLst/>
+          </a:prstGeom>
+        </p:spPr>
+      </p:pic>
+      <p:pic>
+        <p:nvPicPr>
+          <p:cNvPr id="5" name="Picture 4">
+            <a:extLst>
+              <a:ext uri="{FF2B5EF4-FFF2-40B4-BE49-F238E27FC236}">
+                <a16:creationId xmlns:a16="http://schemas.microsoft.com/office/drawing/2014/main" xmlns="" id="{10518762-D144-4B56-B5A8-425A087FE6CE}"/>
+              </a:ext>
+            </a:extLst>
+          </p:cNvPr>
+          <p:cNvPicPr>
+            <a:picLocks noChangeAspect="1"/>
+          </p:cNvPicPr>
+          <p:nvPr/>
+        </p:nvPicPr>
+        <p:blipFill>
+          <a:blip r:embed="rId3" cstate="print"/>
+          <a:stretch>
+            <a:fillRect/>
+          </a:stretch>
+        </p:blipFill>
+        <p:spPr>
+          <a:xfrm>
+            <a:off x="3851920" y="4581128"/>
+            <a:ext cx="5067300" cy="1038225"/>
+          </a:xfrm>
+          <a:prstGeom prst="rect">
+            <a:avLst/>
+          </a:prstGeom>
+        </p:spPr>
+      </p:pic>
     </p:spTree>
   </p:cSld>
   <p:clrMapOvr>
@@ -5105,17 +4965,8 @@
             <a:pPr lvl="0"/>
             <a:r>
               <a:rPr lang="en-NZ" dirty="0"/>
-              <a:t>I</a:t>
-            </a:r>
-            <a:r>
-              <a:rPr lang="en-NZ" dirty="0" smtClean="0"/>
-              <a:t>ntegration </a:t>
-            </a:r>
-            <a:r>
-              <a:rPr lang="en-NZ" dirty="0" smtClean="0"/>
-              <a:t>with the ARM core</a:t>
-            </a:r>
-            <a:endParaRPr lang="en-NZ" dirty="0"/>
+              <a:t>Hardware/Software Integration</a:t>
+            </a:r>
           </a:p>
         </p:txBody>
       </p:sp>
@@ -5137,19 +4988,19 @@
             <a:pPr marL="109728" indent="0">
               <a:buNone/>
             </a:pPr>
-            <a:endParaRPr lang="en-NZ" dirty="0" smtClean="0"/>
+            <a:endParaRPr lang="en-NZ" dirty="0"/>
           </a:p>
           <a:p>
             <a:pPr lvl="0"/>
             <a:r>
-              <a:rPr lang="en-NZ" sz="2300" dirty="0" smtClean="0"/>
+              <a:rPr lang="en-NZ" sz="2300" dirty="0"/>
               <a:t>HPS Bridge which maps ARM memory to Cyclone V PIO</a:t>
             </a:r>
           </a:p>
           <a:p>
             <a:pPr lvl="0"/>
             <a:r>
-              <a:rPr lang="en-NZ" sz="2300" dirty="0" smtClean="0"/>
+              <a:rPr lang="en-NZ" sz="2300" dirty="0"/>
               <a:t>Allows us to write to FPGA registers from C code on Linux system</a:t>
             </a:r>
           </a:p>
@@ -5160,14 +5011,14 @@
           <a:p>
             <a:pPr lvl="0"/>
             <a:r>
-              <a:rPr lang="en-NZ" sz="2300" dirty="0" smtClean="0"/>
+              <a:rPr lang="en-NZ" sz="2300" dirty="0"/>
               <a:t>20 bit data bus, 4 bit control signals</a:t>
             </a:r>
           </a:p>
           <a:p>
             <a:pPr lvl="0"/>
             <a:r>
-              <a:rPr lang="en-NZ" sz="2300" dirty="0" smtClean="0"/>
+              <a:rPr lang="en-NZ" sz="2300" dirty="0"/>
               <a:t>FPGA output can be mapped back to ARM </a:t>
             </a:r>
           </a:p>
@@ -5177,7 +5028,7 @@
           </a:p>
           <a:p>
             <a:pPr lvl="0"/>
-            <a:endParaRPr lang="en-NZ" i="1" dirty="0" smtClean="0"/>
+            <a:endParaRPr lang="en-NZ" i="1" dirty="0"/>
           </a:p>
           <a:p>
             <a:endParaRPr lang="en-NZ" dirty="0"/>
@@ -5227,8 +5078,8 @@
         </p:blipFill>
         <p:spPr>
           <a:xfrm>
-            <a:off x="683568" y="1484784"/>
-            <a:ext cx="4608512" cy="4105920"/>
+            <a:off x="692087" y="1484784"/>
+            <a:ext cx="4591474" cy="4105920"/>
           </a:xfrm>
         </p:spPr>
       </p:pic>
@@ -5251,10 +5102,9 @@
           <a:p>
             <a:pPr lvl="0"/>
             <a:r>
-              <a:rPr lang="en-NZ" dirty="0" smtClean="0"/>
+              <a:rPr lang="en-NZ" dirty="0"/>
               <a:t>HPS Interface and Signals</a:t>
             </a:r>
-            <a:endParaRPr lang="en-NZ" dirty="0"/>
           </a:p>
         </p:txBody>
       </p:sp>

</xml_diff>